<commit_message>
Hyperlinks tussen 1ste dia's toegevoegd
</commit_message>
<xml_diff>
--- a/Prototype.pptx
+++ b/Prototype.pptx
@@ -10,6 +10,8 @@
     <p:sldId id="258" r:id="rId4"/>
     <p:sldId id="259" r:id="rId5"/>
     <p:sldId id="260" r:id="rId6"/>
+    <p:sldId id="261" r:id="rId7"/>
+    <p:sldId id="262" r:id="rId8"/>
   </p:sldIdLst>
   <p:sldSz cx="6858000" cy="12192000"/>
   <p:notesSz cx="6858000" cy="9144000"/>
@@ -108,6 +110,11 @@
       </a:defRPr>
     </a:lvl9pPr>
   </p:defaultTextStyle>
+  <p:extLst>
+    <p:ext uri="{EFAFB233-063F-42B5-8137-9DF3F51BA10A}">
+      <p15:sldGuideLst xmlns:p15="http://schemas.microsoft.com/office/powerpoint/2012/main"/>
+    </p:ext>
+  </p:extLst>
 </p:presentation>
 </file>
 
@@ -3092,6 +3099,125 @@
           </a:p>
         </p:txBody>
       </p:sp>
+      <p:sp>
+        <p:nvSpPr>
+          <p:cNvPr id="5" name="Rechthoek 4">
+            <a:hlinkClick r:id="rId5" action="ppaction://hlinksldjump"/>
+          </p:cNvPr>
+          <p:cNvSpPr/>
+          <p:nvPr/>
+        </p:nvSpPr>
+        <p:spPr>
+          <a:xfrm>
+            <a:off x="733425" y="8037428"/>
+            <a:ext cx="5391150" cy="1284051"/>
+          </a:xfrm>
+          <a:prstGeom prst="rect">
+            <a:avLst/>
+          </a:prstGeom>
+          <a:noFill/>
+          <a:ln>
+            <a:noFill/>
+          </a:ln>
+        </p:spPr>
+        <p:style>
+          <a:lnRef idx="2">
+            <a:schemeClr val="accent1">
+              <a:shade val="50000"/>
+            </a:schemeClr>
+          </a:lnRef>
+          <a:fillRef idx="1">
+            <a:schemeClr val="accent1"/>
+          </a:fillRef>
+          <a:effectRef idx="0">
+            <a:schemeClr val="accent1"/>
+          </a:effectRef>
+          <a:fontRef idx="minor">
+            <a:schemeClr val="lt1"/>
+          </a:fontRef>
+        </p:style>
+        <p:txBody>
+          <a:bodyPr rtlCol="0" anchor="ctr"/>
+          <a:lstStyle/>
+          <a:p>
+            <a:pPr algn="ctr"/>
+            <a:endParaRPr lang="nl-BE"/>
+          </a:p>
+        </p:txBody>
+      </p:sp>
+      <p:sp>
+        <p:nvSpPr>
+          <p:cNvPr id="6" name="Rechthoek 5">
+            <a:hlinkClick r:id="rId6" action="ppaction://hlinksldjump"/>
+          </p:cNvPr>
+          <p:cNvSpPr/>
+          <p:nvPr/>
+        </p:nvSpPr>
+        <p:spPr>
+          <a:xfrm>
+            <a:off x="733425" y="10375640"/>
+            <a:ext cx="5391150" cy="1284051"/>
+          </a:xfrm>
+          <a:prstGeom prst="rect">
+            <a:avLst/>
+          </a:prstGeom>
+          <a:noFill/>
+          <a:ln>
+            <a:noFill/>
+          </a:ln>
+        </p:spPr>
+        <p:style>
+          <a:lnRef idx="2">
+            <a:schemeClr val="accent1">
+              <a:shade val="50000"/>
+            </a:schemeClr>
+          </a:lnRef>
+          <a:fillRef idx="1">
+            <a:schemeClr val="accent1"/>
+          </a:fillRef>
+          <a:effectRef idx="0">
+            <a:schemeClr val="accent1"/>
+          </a:effectRef>
+          <a:fontRef idx="minor">
+            <a:schemeClr val="lt1"/>
+          </a:fontRef>
+        </p:style>
+        <p:txBody>
+          <a:bodyPr rtlCol="0" anchor="ctr"/>
+          <a:lstStyle/>
+          <a:p>
+            <a:pPr algn="ctr"/>
+            <a:endParaRPr lang="nl-BE"/>
+          </a:p>
+        </p:txBody>
+      </p:sp>
+      <p:sp>
+        <p:nvSpPr>
+          <p:cNvPr id="2" name="Titel 1"/>
+          <p:cNvSpPr>
+            <a:spLocks noGrp="1"/>
+          </p:cNvSpPr>
+          <p:nvPr>
+            <p:ph type="ctrTitle"/>
+          </p:nvPr>
+        </p:nvSpPr>
+        <p:spPr>
+          <a:xfrm>
+            <a:off x="-6122933" y="339933"/>
+            <a:ext cx="5829300" cy="4244622"/>
+          </a:xfrm>
+        </p:spPr>
+        <p:txBody>
+          <a:bodyPr/>
+          <a:lstStyle/>
+          <a:p>
+            <a:r>
+              <a:rPr lang="nl-BE" dirty="0"/>
+              <a:t>Startmenu</a:t>
+            </a:r>
+          </a:p>
+        </p:txBody>
+      </p:sp>
     </p:spTree>
     <p:extLst>
       <p:ext uri="{BB962C8B-B14F-4D97-AF65-F5344CB8AC3E}">
@@ -3102,6 +3228,14 @@
   <p:clrMapOvr>
     <a:masterClrMapping/>
   </p:clrMapOvr>
+  <mc:AlternateContent xmlns:mc="http://schemas.openxmlformats.org/markup-compatibility/2006">
+    <mc:Choice xmlns:p14="http://schemas.microsoft.com/office/powerpoint/2010/main" Requires="p14">
+      <p:transition spd="slow" p14:dur="2000" advClick="0"/>
+    </mc:Choice>
+    <mc:Fallback>
+      <p:transition spd="slow" advClick="0"/>
+    </mc:Fallback>
+  </mc:AlternateContent>
 </p:sld>
 </file>
 
@@ -3134,7 +3268,7 @@
         </p:nvSpPr>
         <p:spPr>
           <a:xfrm>
-            <a:off x="-7662862" y="2363614"/>
+            <a:off x="-6086311" y="457200"/>
             <a:ext cx="5915025" cy="2356556"/>
           </a:xfrm>
         </p:spPr>
@@ -3186,14 +3320,16 @@
       </p:pic>
       <p:pic>
         <p:nvPicPr>
-          <p:cNvPr id="6" name="Afbeelding 5"/>
+          <p:cNvPr id="6" name="Afbeelding 5">
+            <a:hlinkClick r:id="rId3" action="ppaction://hlinksldjump"/>
+          </p:cNvPr>
           <p:cNvPicPr>
             <a:picLocks noChangeAspect="1"/>
           </p:cNvPicPr>
           <p:nvPr/>
         </p:nvPicPr>
         <p:blipFill>
-          <a:blip r:embed="rId3">
+          <a:blip r:embed="rId4">
             <a:extLst>
               <a:ext uri="{28A0092B-C50C-407E-A947-70E740481C1C}">
                 <a14:useLocalDpi xmlns:a14="http://schemas.microsoft.com/office/drawing/2010/main" val="0"/>
@@ -3224,6 +3360,14 @@
   <p:clrMapOvr>
     <a:masterClrMapping/>
   </p:clrMapOvr>
+  <mc:AlternateContent xmlns:mc="http://schemas.openxmlformats.org/markup-compatibility/2006">
+    <mc:Choice xmlns:p14="http://schemas.microsoft.com/office/powerpoint/2010/main" Requires="p14">
+      <p:transition spd="slow" p14:dur="2000" advClick="0"/>
+    </mc:Choice>
+    <mc:Fallback>
+      <p:transition spd="slow" advClick="0"/>
+    </mc:Fallback>
+  </mc:AlternateContent>
 </p:sld>
 </file>
 
@@ -3308,14 +3452,16 @@
       </p:pic>
       <p:pic>
         <p:nvPicPr>
-          <p:cNvPr id="5" name="Afbeelding 4"/>
+          <p:cNvPr id="5" name="Afbeelding 4">
+            <a:hlinkClick r:id="rId3" action="ppaction://hlinksldjump"/>
+          </p:cNvPr>
           <p:cNvPicPr>
             <a:picLocks noChangeAspect="1"/>
           </p:cNvPicPr>
           <p:nvPr/>
         </p:nvPicPr>
         <p:blipFill>
-          <a:blip r:embed="rId3">
+          <a:blip r:embed="rId4">
             <a:extLst>
               <a:ext uri="{28A0092B-C50C-407E-A947-70E740481C1C}">
                 <a14:useLocalDpi xmlns:a14="http://schemas.microsoft.com/office/drawing/2010/main" val="0"/>
@@ -3346,6 +3492,14 @@
   <p:clrMapOvr>
     <a:masterClrMapping/>
   </p:clrMapOvr>
+  <mc:AlternateContent xmlns:mc="http://schemas.openxmlformats.org/markup-compatibility/2006">
+    <mc:Choice xmlns:p14="http://schemas.microsoft.com/office/powerpoint/2010/main" Requires="p14">
+      <p:transition spd="slow" p14:dur="2000" advClick="0"/>
+    </mc:Choice>
+    <mc:Fallback>
+      <p:transition spd="slow" advClick="0"/>
+    </mc:Fallback>
+  </mc:AlternateContent>
 </p:sld>
 </file>
 
@@ -3418,127 +3572,6 @@
           <a:xfrm>
             <a:off x="732600" y="1080000"/>
             <a:ext cx="5392800" cy="7622734"/>
-          </a:xfrm>
-          <a:prstGeom prst="rect">
-            <a:avLst/>
-          </a:prstGeom>
-        </p:spPr>
-      </p:pic>
-      <p:pic>
-        <p:nvPicPr>
-          <p:cNvPr id="7" name="Afbeelding 6"/>
-          <p:cNvPicPr>
-            <a:picLocks noChangeAspect="1"/>
-          </p:cNvPicPr>
-          <p:nvPr/>
-        </p:nvPicPr>
-        <p:blipFill>
-          <a:blip r:embed="rId3">
-            <a:extLst>
-              <a:ext uri="{28A0092B-C50C-407E-A947-70E740481C1C}">
-                <a14:useLocalDpi xmlns:a14="http://schemas.microsoft.com/office/drawing/2010/main" val="0"/>
-              </a:ext>
-            </a:extLst>
-          </a:blip>
-          <a:stretch>
-            <a:fillRect/>
-          </a:stretch>
-        </p:blipFill>
-        <p:spPr>
-          <a:xfrm>
-            <a:off x="5655635" y="457200"/>
-            <a:ext cx="939530" cy="939530"/>
-          </a:xfrm>
-          <a:prstGeom prst="rect">
-            <a:avLst/>
-          </a:prstGeom>
-        </p:spPr>
-      </p:pic>
-    </p:spTree>
-    <p:extLst>
-      <p:ext uri="{BB962C8B-B14F-4D97-AF65-F5344CB8AC3E}">
-        <p14:creationId xmlns:p14="http://schemas.microsoft.com/office/powerpoint/2010/main" val="3660785125"/>
-      </p:ext>
-    </p:extLst>
-  </p:cSld>
-  <p:clrMapOvr>
-    <a:masterClrMapping/>
-  </p:clrMapOvr>
-</p:sld>
-</file>
-
-<file path=ppt/slides/slide5.xml><?xml version="1.0" encoding="utf-8"?>
-<p:sld xmlns:a="http://schemas.openxmlformats.org/drawingml/2006/main" xmlns:r="http://schemas.openxmlformats.org/officeDocument/2006/relationships" xmlns:p="http://schemas.openxmlformats.org/presentationml/2006/main">
-  <p:cSld>
-    <p:spTree>
-      <p:nvGrpSpPr>
-        <p:cNvPr id="1" name=""/>
-        <p:cNvGrpSpPr/>
-        <p:nvPr/>
-      </p:nvGrpSpPr>
-      <p:grpSpPr>
-        <a:xfrm>
-          <a:off x="0" y="0"/>
-          <a:ext cx="0" cy="0"/>
-          <a:chOff x="0" y="0"/>
-          <a:chExt cx="0" cy="0"/>
-        </a:xfrm>
-      </p:grpSpPr>
-      <p:sp>
-        <p:nvSpPr>
-          <p:cNvPr id="2" name="Titel 1"/>
-          <p:cNvSpPr>
-            <a:spLocks noGrp="1"/>
-          </p:cNvSpPr>
-          <p:nvPr>
-            <p:ph type="title"/>
-          </p:nvPr>
-        </p:nvSpPr>
-        <p:spPr>
-          <a:xfrm>
-            <a:off x="-7077176" y="1913710"/>
-            <a:ext cx="5915025" cy="2356556"/>
-          </a:xfrm>
-        </p:spPr>
-        <p:txBody>
-          <a:bodyPr/>
-          <a:lstStyle/>
-          <a:p>
-            <a:r>
-              <a:rPr lang="nl-NL" dirty="0"/>
-              <a:t>Opties</a:t>
-            </a:r>
-            <a:br>
-              <a:rPr lang="nl-NL" dirty="0"/>
-            </a:br>
-            <a:endParaRPr lang="nl-BE" dirty="0"/>
-          </a:p>
-        </p:txBody>
-      </p:sp>
-      <p:pic>
-        <p:nvPicPr>
-          <p:cNvPr id="6" name="Afbeelding 5"/>
-          <p:cNvPicPr>
-            <a:picLocks noChangeAspect="1"/>
-          </p:cNvPicPr>
-          <p:nvPr/>
-        </p:nvPicPr>
-        <p:blipFill>
-          <a:blip r:embed="rId2">
-            <a:extLst>
-              <a:ext uri="{28A0092B-C50C-407E-A947-70E740481C1C}">
-                <a14:useLocalDpi xmlns:a14="http://schemas.microsoft.com/office/drawing/2010/main" val="0"/>
-              </a:ext>
-            </a:extLst>
-          </a:blip>
-          <a:stretch>
-            <a:fillRect/>
-          </a:stretch>
-        </p:blipFill>
-        <p:spPr>
-          <a:xfrm>
-            <a:off x="732600" y="1080000"/>
-            <a:ext cx="5392800" cy="10734725"/>
           </a:xfrm>
           <a:prstGeom prst="rect">
             <a:avLst/>
@@ -3580,6 +3613,137 @@
     </p:spTree>
     <p:extLst>
       <p:ext uri="{BB962C8B-B14F-4D97-AF65-F5344CB8AC3E}">
+        <p14:creationId xmlns:p14="http://schemas.microsoft.com/office/powerpoint/2010/main" val="3660785125"/>
+      </p:ext>
+    </p:extLst>
+  </p:cSld>
+  <p:clrMapOvr>
+    <a:masterClrMapping/>
+  </p:clrMapOvr>
+  <mc:AlternateContent xmlns:mc="http://schemas.openxmlformats.org/markup-compatibility/2006">
+    <mc:Choice xmlns:p14="http://schemas.microsoft.com/office/powerpoint/2010/main" Requires="p14">
+      <p:transition spd="slow" p14:dur="2000" advClick="0"/>
+    </mc:Choice>
+    <mc:Fallback>
+      <p:transition spd="slow" advClick="0"/>
+    </mc:Fallback>
+  </mc:AlternateContent>
+</p:sld>
+</file>
+
+<file path=ppt/slides/slide5.xml><?xml version="1.0" encoding="utf-8"?>
+<p:sld xmlns:a="http://schemas.openxmlformats.org/drawingml/2006/main" xmlns:r="http://schemas.openxmlformats.org/officeDocument/2006/relationships" xmlns:p="http://schemas.openxmlformats.org/presentationml/2006/main">
+  <p:cSld>
+    <p:spTree>
+      <p:nvGrpSpPr>
+        <p:cNvPr id="1" name=""/>
+        <p:cNvGrpSpPr/>
+        <p:nvPr/>
+      </p:nvGrpSpPr>
+      <p:grpSpPr>
+        <a:xfrm>
+          <a:off x="0" y="0"/>
+          <a:ext cx="0" cy="0"/>
+          <a:chOff x="0" y="0"/>
+          <a:chExt cx="0" cy="0"/>
+        </a:xfrm>
+      </p:grpSpPr>
+      <p:sp>
+        <p:nvSpPr>
+          <p:cNvPr id="2" name="Titel 1"/>
+          <p:cNvSpPr>
+            <a:spLocks noGrp="1"/>
+          </p:cNvSpPr>
+          <p:nvPr>
+            <p:ph type="title"/>
+          </p:nvPr>
+        </p:nvSpPr>
+        <p:spPr>
+          <a:xfrm>
+            <a:off x="-6147010" y="1080000"/>
+            <a:ext cx="5915025" cy="2356556"/>
+          </a:xfrm>
+        </p:spPr>
+        <p:txBody>
+          <a:bodyPr/>
+          <a:lstStyle/>
+          <a:p>
+            <a:r>
+              <a:rPr lang="nl-NL" dirty="0"/>
+              <a:t>Opties</a:t>
+            </a:r>
+            <a:br>
+              <a:rPr lang="nl-NL" dirty="0"/>
+            </a:br>
+            <a:endParaRPr lang="nl-BE" dirty="0"/>
+          </a:p>
+        </p:txBody>
+      </p:sp>
+      <p:pic>
+        <p:nvPicPr>
+          <p:cNvPr id="6" name="Afbeelding 5"/>
+          <p:cNvPicPr>
+            <a:picLocks noChangeAspect="1"/>
+          </p:cNvPicPr>
+          <p:nvPr/>
+        </p:nvPicPr>
+        <p:blipFill>
+          <a:blip r:embed="rId2">
+            <a:extLst>
+              <a:ext uri="{28A0092B-C50C-407E-A947-70E740481C1C}">
+                <a14:useLocalDpi xmlns:a14="http://schemas.microsoft.com/office/drawing/2010/main" val="0"/>
+              </a:ext>
+            </a:extLst>
+          </a:blip>
+          <a:stretch>
+            <a:fillRect/>
+          </a:stretch>
+        </p:blipFill>
+        <p:spPr>
+          <a:xfrm>
+            <a:off x="732600" y="1080000"/>
+            <a:ext cx="5392800" cy="10734725"/>
+          </a:xfrm>
+          <a:prstGeom prst="rect">
+            <a:avLst/>
+          </a:prstGeom>
+        </p:spPr>
+      </p:pic>
+      <p:pic>
+        <p:nvPicPr>
+          <p:cNvPr id="7" name="Afbeelding 6">
+            <a:hlinkClick r:id="rId3" action="ppaction://hlinksldjump"/>
+          </p:cNvPr>
+          <p:cNvPicPr>
+            <a:picLocks noChangeAspect="1"/>
+          </p:cNvPicPr>
+          <p:nvPr/>
+        </p:nvPicPr>
+        <p:blipFill>
+          <a:blip r:embed="rId4">
+            <a:extLst>
+              <a:ext uri="{28A0092B-C50C-407E-A947-70E740481C1C}">
+                <a14:useLocalDpi xmlns:a14="http://schemas.microsoft.com/office/drawing/2010/main" val="0"/>
+              </a:ext>
+            </a:extLst>
+          </a:blip>
+          <a:stretch>
+            <a:fillRect/>
+          </a:stretch>
+        </p:blipFill>
+        <p:spPr>
+          <a:xfrm>
+            <a:off x="5655635" y="457200"/>
+            <a:ext cx="939530" cy="939530"/>
+          </a:xfrm>
+          <a:prstGeom prst="rect">
+            <a:avLst/>
+          </a:prstGeom>
+        </p:spPr>
+      </p:pic>
+    </p:spTree>
+    <p:extLst>
+      <p:ext uri="{BB962C8B-B14F-4D97-AF65-F5344CB8AC3E}">
         <p14:creationId xmlns:p14="http://schemas.microsoft.com/office/powerpoint/2010/main" val="3033276428"/>
       </p:ext>
     </p:extLst>
@@ -3587,6 +3751,276 @@
   <p:clrMapOvr>
     <a:masterClrMapping/>
   </p:clrMapOvr>
+  <mc:AlternateContent xmlns:mc="http://schemas.openxmlformats.org/markup-compatibility/2006">
+    <mc:Choice xmlns:p14="http://schemas.microsoft.com/office/powerpoint/2010/main" Requires="p14">
+      <p:transition spd="slow" p14:dur="2000" advClick="0"/>
+    </mc:Choice>
+    <mc:Fallback>
+      <p:transition spd="slow" advClick="0"/>
+    </mc:Fallback>
+  </mc:AlternateContent>
+</p:sld>
+</file>
+
+<file path=ppt/slides/slide6.xml><?xml version="1.0" encoding="utf-8"?>
+<p:sld xmlns:a="http://schemas.openxmlformats.org/drawingml/2006/main" xmlns:r="http://schemas.openxmlformats.org/officeDocument/2006/relationships" xmlns:p="http://schemas.openxmlformats.org/presentationml/2006/main">
+  <p:cSld>
+    <p:spTree>
+      <p:nvGrpSpPr>
+        <p:cNvPr id="1" name=""/>
+        <p:cNvGrpSpPr/>
+        <p:nvPr/>
+      </p:nvGrpSpPr>
+      <p:grpSpPr>
+        <a:xfrm>
+          <a:off x="0" y="0"/>
+          <a:ext cx="0" cy="0"/>
+          <a:chOff x="0" y="0"/>
+          <a:chExt cx="0" cy="0"/>
+        </a:xfrm>
+      </p:grpSpPr>
+      <p:sp>
+        <p:nvSpPr>
+          <p:cNvPr id="2" name="Titel 1"/>
+          <p:cNvSpPr>
+            <a:spLocks noGrp="1"/>
+          </p:cNvSpPr>
+          <p:nvPr>
+            <p:ph type="title"/>
+          </p:nvPr>
+        </p:nvSpPr>
+        <p:spPr>
+          <a:xfrm>
+            <a:off x="-6147010" y="1080000"/>
+            <a:ext cx="5915025" cy="2356556"/>
+          </a:xfrm>
+        </p:spPr>
+        <p:txBody>
+          <a:bodyPr/>
+          <a:lstStyle/>
+          <a:p>
+            <a:r>
+              <a:rPr lang="nl-NL" dirty="0"/>
+              <a:t>Opties</a:t>
+            </a:r>
+            <a:br>
+              <a:rPr lang="nl-NL" dirty="0"/>
+            </a:br>
+            <a:endParaRPr lang="nl-BE" dirty="0"/>
+          </a:p>
+        </p:txBody>
+      </p:sp>
+      <p:pic>
+        <p:nvPicPr>
+          <p:cNvPr id="6" name="Afbeelding 5"/>
+          <p:cNvPicPr>
+            <a:picLocks noChangeAspect="1"/>
+          </p:cNvPicPr>
+          <p:nvPr/>
+        </p:nvPicPr>
+        <p:blipFill>
+          <a:blip r:embed="rId2">
+            <a:extLst>
+              <a:ext uri="{28A0092B-C50C-407E-A947-70E740481C1C}">
+                <a14:useLocalDpi xmlns:a14="http://schemas.microsoft.com/office/drawing/2010/main" val="0"/>
+              </a:ext>
+            </a:extLst>
+          </a:blip>
+          <a:stretch>
+            <a:fillRect/>
+          </a:stretch>
+        </p:blipFill>
+        <p:spPr>
+          <a:xfrm>
+            <a:off x="732600" y="1080000"/>
+            <a:ext cx="5392800" cy="10734725"/>
+          </a:xfrm>
+          <a:prstGeom prst="rect">
+            <a:avLst/>
+          </a:prstGeom>
+        </p:spPr>
+      </p:pic>
+      <p:pic>
+        <p:nvPicPr>
+          <p:cNvPr id="7" name="Afbeelding 6">
+            <a:hlinkClick r:id="rId3" action="ppaction://hlinksldjump"/>
+          </p:cNvPr>
+          <p:cNvPicPr>
+            <a:picLocks noChangeAspect="1"/>
+          </p:cNvPicPr>
+          <p:nvPr/>
+        </p:nvPicPr>
+        <p:blipFill>
+          <a:blip r:embed="rId4">
+            <a:extLst>
+              <a:ext uri="{28A0092B-C50C-407E-A947-70E740481C1C}">
+                <a14:useLocalDpi xmlns:a14="http://schemas.microsoft.com/office/drawing/2010/main" val="0"/>
+              </a:ext>
+            </a:extLst>
+          </a:blip>
+          <a:stretch>
+            <a:fillRect/>
+          </a:stretch>
+        </p:blipFill>
+        <p:spPr>
+          <a:xfrm>
+            <a:off x="5655635" y="457200"/>
+            <a:ext cx="939530" cy="939530"/>
+          </a:xfrm>
+          <a:prstGeom prst="rect">
+            <a:avLst/>
+          </a:prstGeom>
+        </p:spPr>
+      </p:pic>
+    </p:spTree>
+    <p:extLst>
+      <p:ext uri="{BB962C8B-B14F-4D97-AF65-F5344CB8AC3E}">
+        <p14:creationId xmlns:p14="http://schemas.microsoft.com/office/powerpoint/2010/main" val="730103284"/>
+      </p:ext>
+    </p:extLst>
+  </p:cSld>
+  <p:clrMapOvr>
+    <a:masterClrMapping/>
+  </p:clrMapOvr>
+  <mc:AlternateContent xmlns:mc="http://schemas.openxmlformats.org/markup-compatibility/2006">
+    <mc:Choice xmlns:p14="http://schemas.microsoft.com/office/powerpoint/2010/main" Requires="p14">
+      <p:transition spd="slow" p14:dur="2000" advClick="0"/>
+    </mc:Choice>
+    <mc:Fallback>
+      <p:transition spd="slow" advClick="0"/>
+    </mc:Fallback>
+  </mc:AlternateContent>
+</p:sld>
+</file>
+
+<file path=ppt/slides/slide7.xml><?xml version="1.0" encoding="utf-8"?>
+<p:sld xmlns:a="http://schemas.openxmlformats.org/drawingml/2006/main" xmlns:r="http://schemas.openxmlformats.org/officeDocument/2006/relationships" xmlns:p="http://schemas.openxmlformats.org/presentationml/2006/main">
+  <p:cSld>
+    <p:spTree>
+      <p:nvGrpSpPr>
+        <p:cNvPr id="1" name=""/>
+        <p:cNvGrpSpPr/>
+        <p:nvPr/>
+      </p:nvGrpSpPr>
+      <p:grpSpPr>
+        <a:xfrm>
+          <a:off x="0" y="0"/>
+          <a:ext cx="0" cy="0"/>
+          <a:chOff x="0" y="0"/>
+          <a:chExt cx="0" cy="0"/>
+        </a:xfrm>
+      </p:grpSpPr>
+      <p:sp>
+        <p:nvSpPr>
+          <p:cNvPr id="2" name="Titel 1"/>
+          <p:cNvSpPr>
+            <a:spLocks noGrp="1"/>
+          </p:cNvSpPr>
+          <p:nvPr>
+            <p:ph type="title"/>
+          </p:nvPr>
+        </p:nvSpPr>
+        <p:spPr>
+          <a:xfrm>
+            <a:off x="-6147010" y="1080000"/>
+            <a:ext cx="5915025" cy="2356556"/>
+          </a:xfrm>
+        </p:spPr>
+        <p:txBody>
+          <a:bodyPr/>
+          <a:lstStyle/>
+          <a:p>
+            <a:r>
+              <a:rPr lang="nl-NL" dirty="0"/>
+              <a:t>Opties</a:t>
+            </a:r>
+            <a:br>
+              <a:rPr lang="nl-NL" dirty="0"/>
+            </a:br>
+            <a:endParaRPr lang="nl-BE" dirty="0"/>
+          </a:p>
+        </p:txBody>
+      </p:sp>
+      <p:pic>
+        <p:nvPicPr>
+          <p:cNvPr id="6" name="Afbeelding 5"/>
+          <p:cNvPicPr>
+            <a:picLocks noChangeAspect="1"/>
+          </p:cNvPicPr>
+          <p:nvPr/>
+        </p:nvPicPr>
+        <p:blipFill>
+          <a:blip r:embed="rId2">
+            <a:extLst>
+              <a:ext uri="{28A0092B-C50C-407E-A947-70E740481C1C}">
+                <a14:useLocalDpi xmlns:a14="http://schemas.microsoft.com/office/drawing/2010/main" val="0"/>
+              </a:ext>
+            </a:extLst>
+          </a:blip>
+          <a:stretch>
+            <a:fillRect/>
+          </a:stretch>
+        </p:blipFill>
+        <p:spPr>
+          <a:xfrm>
+            <a:off x="732600" y="1080000"/>
+            <a:ext cx="5392800" cy="10734725"/>
+          </a:xfrm>
+          <a:prstGeom prst="rect">
+            <a:avLst/>
+          </a:prstGeom>
+        </p:spPr>
+      </p:pic>
+      <p:pic>
+        <p:nvPicPr>
+          <p:cNvPr id="7" name="Afbeelding 6">
+            <a:hlinkClick r:id="rId3" action="ppaction://hlinksldjump"/>
+          </p:cNvPr>
+          <p:cNvPicPr>
+            <a:picLocks noChangeAspect="1"/>
+          </p:cNvPicPr>
+          <p:nvPr/>
+        </p:nvPicPr>
+        <p:blipFill>
+          <a:blip r:embed="rId4">
+            <a:extLst>
+              <a:ext uri="{28A0092B-C50C-407E-A947-70E740481C1C}">
+                <a14:useLocalDpi xmlns:a14="http://schemas.microsoft.com/office/drawing/2010/main" val="0"/>
+              </a:ext>
+            </a:extLst>
+          </a:blip>
+          <a:stretch>
+            <a:fillRect/>
+          </a:stretch>
+        </p:blipFill>
+        <p:spPr>
+          <a:xfrm>
+            <a:off x="5655635" y="457200"/>
+            <a:ext cx="939530" cy="939530"/>
+          </a:xfrm>
+          <a:prstGeom prst="rect">
+            <a:avLst/>
+          </a:prstGeom>
+        </p:spPr>
+      </p:pic>
+    </p:spTree>
+    <p:extLst>
+      <p:ext uri="{BB962C8B-B14F-4D97-AF65-F5344CB8AC3E}">
+        <p14:creationId xmlns:p14="http://schemas.microsoft.com/office/powerpoint/2010/main" val="1092750069"/>
+      </p:ext>
+    </p:extLst>
+  </p:cSld>
+  <p:clrMapOvr>
+    <a:masterClrMapping/>
+  </p:clrMapOvr>
+  <mc:AlternateContent xmlns:mc="http://schemas.openxmlformats.org/markup-compatibility/2006">
+    <mc:Choice xmlns:p14="http://schemas.microsoft.com/office/powerpoint/2010/main" Requires="p14">
+      <p:transition spd="slow" p14:dur="2000" advClick="0"/>
+    </mc:Choice>
+    <mc:Fallback>
+      <p:transition spd="slow" advClick="0"/>
+    </mc:Fallback>
+  </mc:AlternateContent>
 </p:sld>
 </file>
 

</xml_diff>